<commit_message>
rename guidance and add parent relationship
</commit_message>
<xml_diff>
--- a/additional-ig-content/illustrations.pptx
+++ b/additional-ig-content/illustrations.pptx
@@ -7423,7 +7423,7 @@
         <p:spPr>
           <a:xfrm>
             <a:off x="8856924" y="257577"/>
-            <a:ext cx="2163098" cy="4159877"/>
+            <a:ext cx="2163098" cy="6564882"/>
           </a:xfrm>
           <a:prstGeom prst="rect">
             <a:avLst/>
@@ -8801,6 +8801,254 @@
                 <a:ea typeface="Verdana" panose="020B0604030504040204" pitchFamily="34" charset="0"/>
               </a:rPr>
               <a:t>partOf</a:t>
+            </a:r>
+          </a:p>
+        </p:txBody>
+      </p:sp>
+      <p:sp>
+        <p:nvSpPr>
+          <p:cNvPr id="5" name="Rectangle 4">
+            <a:extLst>
+              <a:ext uri="{FF2B5EF4-FFF2-40B4-BE49-F238E27FC236}">
+                <a16:creationId xmlns:a16="http://schemas.microsoft.com/office/drawing/2014/main" id="{155B062B-87FB-DD4C-A250-6D56AD9B7651}"/>
+              </a:ext>
+            </a:extLst>
+          </p:cNvPr>
+          <p:cNvSpPr/>
+          <p:nvPr/>
+        </p:nvSpPr>
+        <p:spPr>
+          <a:xfrm>
+            <a:off x="4374702" y="5673140"/>
+            <a:ext cx="2232000" cy="647157"/>
+          </a:xfrm>
+          <a:prstGeom prst="rect">
+            <a:avLst/>
+          </a:prstGeom>
+          <a:noFill/>
+          <a:ln w="19050" cap="flat" cmpd="sng" algn="ctr">
+            <a:solidFill>
+              <a:srgbClr val="A72931"/>
+            </a:solidFill>
+            <a:prstDash val="solid"/>
+            <a:miter lim="800000"/>
+          </a:ln>
+          <a:effectLst/>
+        </p:spPr>
+        <p:txBody>
+          <a:bodyPr rtlCol="0" anchor="ctr"/>
+          <a:lstStyle/>
+          <a:p>
+            <a:pPr algn="ctr" defTabSz="684886">
+              <a:defRPr/>
+            </a:pPr>
+            <a:r>
+              <a:rPr lang="en-US" sz="1198" kern="0" dirty="0">
+                <a:solidFill>
+                  <a:prstClr val="black"/>
+                </a:solidFill>
+                <a:latin typeface="Verdana" panose="020B0604030504040204" pitchFamily="34" charset="0"/>
+                <a:ea typeface="Verdana" panose="020B0604030504040204" pitchFamily="34" charset="0"/>
+              </a:rPr>
+              <a:t>CH EPREG RelatedPerson:</a:t>
+            </a:r>
+            <a:br>
+              <a:rPr lang="en-US" sz="1198" kern="0" dirty="0">
+                <a:solidFill>
+                  <a:prstClr val="black"/>
+                </a:solidFill>
+                <a:latin typeface="Verdana" panose="020B0604030504040204" pitchFamily="34" charset="0"/>
+                <a:ea typeface="Verdana" panose="020B0604030504040204" pitchFamily="34" charset="0"/>
+              </a:rPr>
+            </a:br>
+            <a:r>
+              <a:rPr lang="en-US" sz="1198" kern="0" dirty="0">
+                <a:solidFill>
+                  <a:prstClr val="black"/>
+                </a:solidFill>
+                <a:latin typeface="Verdana" panose="020B0604030504040204" pitchFamily="34" charset="0"/>
+                <a:ea typeface="Verdana" panose="020B0604030504040204" pitchFamily="34" charset="0"/>
+              </a:rPr>
+              <a:t>Parent</a:t>
+            </a:r>
+            <a:endParaRPr lang="en-US" sz="899" kern="0" dirty="0">
+              <a:solidFill>
+                <a:prstClr val="black"/>
+              </a:solidFill>
+              <a:latin typeface="Verdana" panose="020B0604030504040204" pitchFamily="34" charset="0"/>
+              <a:ea typeface="Verdana" panose="020B0604030504040204" pitchFamily="34" charset="0"/>
+            </a:endParaRPr>
+          </a:p>
+        </p:txBody>
+      </p:sp>
+      <p:sp>
+        <p:nvSpPr>
+          <p:cNvPr id="10" name="Rectangle 9">
+            <a:extLst>
+              <a:ext uri="{FF2B5EF4-FFF2-40B4-BE49-F238E27FC236}">
+                <a16:creationId xmlns:a16="http://schemas.microsoft.com/office/drawing/2014/main" id="{CCBEC736-A0B1-76BF-070A-684CE3DEAFA8}"/>
+              </a:ext>
+            </a:extLst>
+          </p:cNvPr>
+          <p:cNvSpPr/>
+          <p:nvPr/>
+        </p:nvSpPr>
+        <p:spPr>
+          <a:xfrm>
+            <a:off x="7648847" y="5673140"/>
+            <a:ext cx="2232000" cy="647157"/>
+          </a:xfrm>
+          <a:prstGeom prst="rect">
+            <a:avLst/>
+          </a:prstGeom>
+          <a:noFill/>
+          <a:ln w="19050" cap="flat" cmpd="sng" algn="ctr">
+            <a:solidFill>
+              <a:srgbClr val="F79646"/>
+            </a:solidFill>
+            <a:prstDash val="solid"/>
+            <a:miter lim="800000"/>
+          </a:ln>
+          <a:effectLst/>
+        </p:spPr>
+        <p:txBody>
+          <a:bodyPr rtlCol="0" anchor="ctr"/>
+          <a:lstStyle/>
+          <a:p>
+            <a:pPr algn="ctr" defTabSz="684886">
+              <a:defRPr/>
+            </a:pPr>
+            <a:r>
+              <a:rPr lang="en-US" sz="1198" kern="0" dirty="0">
+                <a:solidFill>
+                  <a:prstClr val="black"/>
+                </a:solidFill>
+                <a:latin typeface="Verdana" panose="020B0604030504040204" pitchFamily="34" charset="0"/>
+                <a:ea typeface="Verdana" panose="020B0604030504040204" pitchFamily="34" charset="0"/>
+              </a:rPr>
+              <a:t>CH EPREG Patient:</a:t>
+            </a:r>
+            <a:br>
+              <a:rPr lang="en-US" sz="1198" kern="0" dirty="0">
+                <a:solidFill>
+                  <a:prstClr val="black"/>
+                </a:solidFill>
+                <a:latin typeface="Verdana" panose="020B0604030504040204" pitchFamily="34" charset="0"/>
+                <a:ea typeface="Verdana" panose="020B0604030504040204" pitchFamily="34" charset="0"/>
+              </a:rPr>
+            </a:br>
+            <a:r>
+              <a:rPr lang="en-US" sz="1198" kern="0" dirty="0">
+                <a:solidFill>
+                  <a:prstClr val="black"/>
+                </a:solidFill>
+                <a:latin typeface="Verdana" panose="020B0604030504040204" pitchFamily="34" charset="0"/>
+                <a:ea typeface="Verdana" panose="020B0604030504040204" pitchFamily="34" charset="0"/>
+              </a:rPr>
+              <a:t>Child</a:t>
+            </a:r>
+            <a:endParaRPr lang="en-US" sz="899" kern="0" dirty="0">
+              <a:solidFill>
+                <a:prstClr val="black"/>
+              </a:solidFill>
+              <a:latin typeface="Verdana" panose="020B0604030504040204" pitchFamily="34" charset="0"/>
+              <a:ea typeface="Verdana" panose="020B0604030504040204" pitchFamily="34" charset="0"/>
+            </a:endParaRPr>
+          </a:p>
+        </p:txBody>
+      </p:sp>
+      <p:cxnSp>
+        <p:nvCxnSpPr>
+          <p:cNvPr id="11" name="Straight Arrow Connector 10">
+            <a:extLst>
+              <a:ext uri="{FF2B5EF4-FFF2-40B4-BE49-F238E27FC236}">
+                <a16:creationId xmlns:a16="http://schemas.microsoft.com/office/drawing/2014/main" id="{82920BE7-E143-17E8-1A34-D2F0A807C165}"/>
+              </a:ext>
+            </a:extLst>
+          </p:cNvPr>
+          <p:cNvCxnSpPr>
+            <a:cxnSpLocks/>
+            <a:stCxn id="5" idx="3"/>
+            <a:endCxn id="10" idx="1"/>
+          </p:cNvCxnSpPr>
+          <p:nvPr/>
+        </p:nvCxnSpPr>
+        <p:spPr>
+          <a:xfrm>
+            <a:off x="6606702" y="5996719"/>
+            <a:ext cx="1042145" cy="0"/>
+          </a:xfrm>
+          <a:prstGeom prst="straightConnector1">
+            <a:avLst/>
+          </a:prstGeom>
+          <a:ln w="19050">
+            <a:solidFill>
+              <a:srgbClr val="B6B6B6"/>
+            </a:solidFill>
+            <a:tailEnd type="triangle"/>
+          </a:ln>
+        </p:spPr>
+        <p:style>
+          <a:lnRef idx="1">
+            <a:schemeClr val="accent1"/>
+          </a:lnRef>
+          <a:fillRef idx="0">
+            <a:schemeClr val="accent1"/>
+          </a:fillRef>
+          <a:effectRef idx="0">
+            <a:schemeClr val="accent1"/>
+          </a:effectRef>
+          <a:fontRef idx="minor">
+            <a:schemeClr val="tx1"/>
+          </a:fontRef>
+        </p:style>
+      </p:cxnSp>
+      <p:sp>
+        <p:nvSpPr>
+          <p:cNvPr id="16" name="Rectangle 15">
+            <a:extLst>
+              <a:ext uri="{FF2B5EF4-FFF2-40B4-BE49-F238E27FC236}">
+                <a16:creationId xmlns:a16="http://schemas.microsoft.com/office/drawing/2014/main" id="{4EDDD783-59F3-E00C-7744-878C528C1DB9}"/>
+              </a:ext>
+            </a:extLst>
+          </p:cNvPr>
+          <p:cNvSpPr/>
+          <p:nvPr/>
+        </p:nvSpPr>
+        <p:spPr>
+          <a:xfrm>
+            <a:off x="6661502" y="5670807"/>
+            <a:ext cx="932544" cy="323579"/>
+          </a:xfrm>
+          <a:prstGeom prst="rect">
+            <a:avLst/>
+          </a:prstGeom>
+          <a:noFill/>
+          <a:ln w="12700" cap="flat" cmpd="sng" algn="ctr">
+            <a:noFill/>
+            <a:prstDash val="solid"/>
+            <a:miter lim="800000"/>
+          </a:ln>
+          <a:effectLst/>
+        </p:spPr>
+        <p:txBody>
+          <a:bodyPr rtlCol="0" anchor="ctr"/>
+          <a:lstStyle/>
+          <a:p>
+            <a:pPr algn="ctr" defTabSz="684886">
+              <a:defRPr/>
+            </a:pPr>
+            <a:r>
+              <a:rPr lang="en-US" sz="1198" kern="0" dirty="0">
+                <a:solidFill>
+                  <a:schemeClr val="bg1">
+                    <a:lumMod val="50000"/>
+                  </a:schemeClr>
+                </a:solidFill>
+                <a:latin typeface="Verdana" panose="020B0604030504040204" pitchFamily="34" charset="0"/>
+                <a:ea typeface="Verdana" panose="020B0604030504040204" pitchFamily="34" charset="0"/>
+              </a:rPr>
+              <a:t>patient</a:t>
             </a:r>
           </a:p>
         </p:txBody>

</xml_diff>

<commit_message>
add parent as subsection in new section coreData
</commit_message>
<xml_diff>
--- a/additional-ig-content/illustrations.pptx
+++ b/additional-ig-content/illustrations.pptx
@@ -210,7 +210,7 @@
           <a:p>
             <a:fld id="{AA0936E0-B937-435B-957D-29657CD375E8}" type="datetimeFigureOut">
               <a:rPr lang="de-CH" smtClean="0"/>
-              <a:t>30.04.2025</a:t>
+              <a:t>05.05.2025</a:t>
             </a:fld>
             <a:endParaRPr lang="de-CH"/>
           </a:p>
@@ -849,7 +849,7 @@
           <a:p>
             <a:fld id="{DAD4AEBD-E175-AE42-B084-2E4026DB8423}" type="datetimeFigureOut">
               <a:rPr lang="de-DE" smtClean="0"/>
-              <a:t>30.04.2025</a:t>
+              <a:t>05.05.2025</a:t>
             </a:fld>
             <a:endParaRPr lang="de-DE"/>
           </a:p>
@@ -1017,7 +1017,7 @@
           <a:p>
             <a:fld id="{DAD4AEBD-E175-AE42-B084-2E4026DB8423}" type="datetimeFigureOut">
               <a:rPr lang="de-DE" smtClean="0"/>
-              <a:t>30.04.2025</a:t>
+              <a:t>05.05.2025</a:t>
             </a:fld>
             <a:endParaRPr lang="de-DE"/>
           </a:p>
@@ -1195,7 +1195,7 @@
           <a:p>
             <a:fld id="{DAD4AEBD-E175-AE42-B084-2E4026DB8423}" type="datetimeFigureOut">
               <a:rPr lang="de-DE" smtClean="0"/>
-              <a:t>30.04.2025</a:t>
+              <a:t>05.05.2025</a:t>
             </a:fld>
             <a:endParaRPr lang="de-DE"/>
           </a:p>
@@ -1650,7 +1650,7 @@
           <a:p>
             <a:fld id="{DAD4AEBD-E175-AE42-B084-2E4026DB8423}" type="datetimeFigureOut">
               <a:rPr lang="de-DE" smtClean="0"/>
-              <a:t>30.04.2025</a:t>
+              <a:t>05.05.2025</a:t>
             </a:fld>
             <a:endParaRPr lang="de-DE"/>
           </a:p>
@@ -1895,7 +1895,7 @@
           <a:p>
             <a:fld id="{DAD4AEBD-E175-AE42-B084-2E4026DB8423}" type="datetimeFigureOut">
               <a:rPr lang="de-DE" smtClean="0"/>
-              <a:t>30.04.2025</a:t>
+              <a:t>05.05.2025</a:t>
             </a:fld>
             <a:endParaRPr lang="de-DE"/>
           </a:p>
@@ -2180,7 +2180,7 @@
           <a:p>
             <a:fld id="{DAD4AEBD-E175-AE42-B084-2E4026DB8423}" type="datetimeFigureOut">
               <a:rPr lang="de-DE" smtClean="0"/>
-              <a:t>30.04.2025</a:t>
+              <a:t>05.05.2025</a:t>
             </a:fld>
             <a:endParaRPr lang="de-DE"/>
           </a:p>
@@ -2599,7 +2599,7 @@
           <a:p>
             <a:fld id="{DAD4AEBD-E175-AE42-B084-2E4026DB8423}" type="datetimeFigureOut">
               <a:rPr lang="de-DE" smtClean="0"/>
-              <a:t>30.04.2025</a:t>
+              <a:t>05.05.2025</a:t>
             </a:fld>
             <a:endParaRPr lang="de-DE"/>
           </a:p>
@@ -2716,7 +2716,7 @@
           <a:p>
             <a:fld id="{DAD4AEBD-E175-AE42-B084-2E4026DB8423}" type="datetimeFigureOut">
               <a:rPr lang="de-DE" smtClean="0"/>
-              <a:t>30.04.2025</a:t>
+              <a:t>05.05.2025</a:t>
             </a:fld>
             <a:endParaRPr lang="de-DE"/>
           </a:p>
@@ -2811,7 +2811,7 @@
           <a:p>
             <a:fld id="{DAD4AEBD-E175-AE42-B084-2E4026DB8423}" type="datetimeFigureOut">
               <a:rPr lang="de-DE" smtClean="0"/>
-              <a:t>30.04.2025</a:t>
+              <a:t>05.05.2025</a:t>
             </a:fld>
             <a:endParaRPr lang="de-DE"/>
           </a:p>
@@ -3086,7 +3086,7 @@
           <a:p>
             <a:fld id="{DAD4AEBD-E175-AE42-B084-2E4026DB8423}" type="datetimeFigureOut">
               <a:rPr lang="de-DE" smtClean="0"/>
-              <a:t>30.04.2025</a:t>
+              <a:t>05.05.2025</a:t>
             </a:fld>
             <a:endParaRPr lang="de-DE"/>
           </a:p>
@@ -3338,7 +3338,7 @@
           <a:p>
             <a:fld id="{DAD4AEBD-E175-AE42-B084-2E4026DB8423}" type="datetimeFigureOut">
               <a:rPr lang="de-DE" smtClean="0"/>
-              <a:t>30.04.2025</a:t>
+              <a:t>05.05.2025</a:t>
             </a:fld>
             <a:endParaRPr lang="de-DE"/>
           </a:p>
@@ -3549,7 +3549,7 @@
           <a:p>
             <a:fld id="{DAD4AEBD-E175-AE42-B084-2E4026DB8423}" type="datetimeFigureOut">
               <a:rPr lang="de-DE" smtClean="0"/>
-              <a:t>30.04.2025</a:t>
+              <a:t>05.05.2025</a:t>
             </a:fld>
             <a:endParaRPr lang="de-DE"/>
           </a:p>
@@ -3939,8 +3939,8 @@
         </p:nvSpPr>
         <p:spPr>
           <a:xfrm>
-            <a:off x="-107344" y="6571128"/>
-            <a:ext cx="5764697" cy="5522806"/>
+            <a:off x="-107344" y="6858000"/>
+            <a:ext cx="5764697" cy="7217134"/>
           </a:xfrm>
           <a:prstGeom prst="rect">
             <a:avLst/>
@@ -3987,7 +3987,7 @@
         <p:spPr bwMode="auto">
           <a:xfrm flipV="1">
             <a:off x="241175" y="108208"/>
-            <a:ext cx="4999898" cy="11619966"/>
+            <a:ext cx="4999898" cy="9175358"/>
           </a:xfrm>
           <a:prstGeom prst="foldedCorner">
             <a:avLst>
@@ -4173,7 +4173,7 @@
         <p:spPr bwMode="auto">
           <a:xfrm>
             <a:off x="442115" y="868268"/>
-            <a:ext cx="4580553" cy="8848226"/>
+            <a:ext cx="4580553" cy="6245940"/>
           </a:xfrm>
           <a:prstGeom prst="rect">
             <a:avLst/>
@@ -4312,7 +4312,7 @@
         <p:spPr bwMode="auto">
           <a:xfrm>
             <a:off x="613408" y="1578324"/>
-            <a:ext cx="4184753" cy="338554"/>
+            <a:ext cx="4184753" cy="360000"/>
           </a:xfrm>
           <a:prstGeom prst="rect">
             <a:avLst/>
@@ -4435,8 +4435,8 @@
         </p:nvSpPr>
         <p:spPr bwMode="auto">
           <a:xfrm>
-            <a:off x="613408" y="2392954"/>
-            <a:ext cx="4184753" cy="828000"/>
+            <a:off x="613407" y="2481956"/>
+            <a:ext cx="4184753" cy="360000"/>
           </a:xfrm>
           <a:prstGeom prst="rect">
             <a:avLst/>
@@ -4496,7 +4496,13 @@
       </p:sp>
       <p:sp>
         <p:nvSpPr>
-          <p:cNvPr id="12" name="Text Box 10"/>
+          <p:cNvPr id="15" name="Text Box 10">
+            <a:extLst>
+              <a:ext uri="{FF2B5EF4-FFF2-40B4-BE49-F238E27FC236}">
+                <a16:creationId xmlns:a16="http://schemas.microsoft.com/office/drawing/2014/main" id="{03909A10-374D-41D8-B1EC-53CBA6BDB1AE}"/>
+              </a:ext>
+            </a:extLst>
+          </p:cNvPr>
           <p:cNvSpPr txBox="1">
             <a:spLocks noChangeArrowheads="1"/>
           </p:cNvSpPr>
@@ -4504,8 +4510,71 @@
         </p:nvSpPr>
         <p:spPr bwMode="auto">
           <a:xfrm>
-            <a:off x="757646" y="2745229"/>
-            <a:ext cx="3845730" cy="338554"/>
+            <a:off x="442114" y="8228709"/>
+            <a:ext cx="4580551" cy="360000"/>
+          </a:xfrm>
+          <a:prstGeom prst="rect">
+            <a:avLst/>
+          </a:prstGeom>
+          <a:ln>
+            <a:headEnd/>
+            <a:tailEnd/>
+          </a:ln>
+        </p:spPr>
+        <p:style>
+          <a:lnRef idx="0">
+            <a:schemeClr val="accent2"/>
+          </a:lnRef>
+          <a:fillRef idx="3">
+            <a:schemeClr val="accent2"/>
+          </a:fillRef>
+          <a:effectRef idx="3">
+            <a:schemeClr val="accent2"/>
+          </a:effectRef>
+          <a:fontRef idx="minor">
+            <a:schemeClr val="lt1"/>
+          </a:fontRef>
+        </p:style>
+        <p:txBody>
+          <a:bodyPr wrap="square">
+            <a:spAutoFit/>
+          </a:bodyPr>
+          <a:lstStyle/>
+          <a:p>
+            <a:pPr>
+              <a:spcBef>
+                <a:spcPts val="300"/>
+              </a:spcBef>
+              <a:spcAft>
+                <a:spcPts val="300"/>
+              </a:spcAft>
+              <a:defRPr/>
+            </a:pPr>
+            <a:r>
+              <a:rPr lang="fr-FR" sz="1600" noProof="1"/>
+              <a:t>entry: Observation</a:t>
+            </a:r>
+          </a:p>
+        </p:txBody>
+      </p:sp>
+      <p:sp>
+        <p:nvSpPr>
+          <p:cNvPr id="16" name="Text Box 10">
+            <a:extLst>
+              <a:ext uri="{FF2B5EF4-FFF2-40B4-BE49-F238E27FC236}">
+                <a16:creationId xmlns:a16="http://schemas.microsoft.com/office/drawing/2014/main" id="{A1E94DDC-9D5C-4D8C-A306-342496404C16}"/>
+              </a:ext>
+            </a:extLst>
+          </p:cNvPr>
+          <p:cNvSpPr txBox="1">
+            <a:spLocks noChangeArrowheads="1"/>
+          </p:cNvSpPr>
+          <p:nvPr/>
+        </p:nvSpPr>
+        <p:spPr bwMode="auto">
+          <a:xfrm>
+            <a:off x="613408" y="2032821"/>
+            <a:ext cx="4184753" cy="360000"/>
           </a:xfrm>
           <a:prstGeom prst="rect">
             <a:avLst/>
@@ -4550,7 +4619,7 @@
                   <a:schemeClr val="tx1"/>
                 </a:solidFill>
               </a:rPr>
-              <a:t>Binary</a:t>
+              <a:t>Document Author</a:t>
             </a:r>
             <a:r>
               <a:rPr lang="fr-FR" sz="1600" noProof="1">
@@ -4565,10 +4634,67 @@
       </p:sp>
       <p:sp>
         <p:nvSpPr>
-          <p:cNvPr id="15" name="Text Box 10">
+          <p:cNvPr id="17" name="Textfeld 16">
             <a:extLst>
               <a:ext uri="{FF2B5EF4-FFF2-40B4-BE49-F238E27FC236}">
-                <a16:creationId xmlns:a16="http://schemas.microsoft.com/office/drawing/2014/main" id="{03909A10-374D-41D8-B1EC-53CBA6BDB1AE}"/>
+                <a16:creationId xmlns:a16="http://schemas.microsoft.com/office/drawing/2014/main" id="{B39AD430-D951-4118-B787-96FF87B0655A}"/>
+              </a:ext>
+            </a:extLst>
+          </p:cNvPr>
+          <p:cNvSpPr txBox="1"/>
+          <p:nvPr/>
+        </p:nvSpPr>
+        <p:spPr>
+          <a:xfrm>
+            <a:off x="561774" y="1238870"/>
+            <a:ext cx="3318851" cy="523220"/>
+          </a:xfrm>
+          <a:prstGeom prst="rect">
+            <a:avLst/>
+          </a:prstGeom>
+          <a:noFill/>
+        </p:spPr>
+        <p:txBody>
+          <a:bodyPr wrap="square" rtlCol="0">
+            <a:spAutoFit/>
+          </a:bodyPr>
+          <a:lstStyle/>
+          <a:p>
+            <a:pPr marL="285750" indent="-285750">
+              <a:buFont typeface="Arial"/>
+              <a:buChar char="•"/>
+              <a:defRPr/>
+            </a:pPr>
+            <a:r>
+              <a:rPr lang="de-DE" sz="1400" i="1" dirty="0">
+                <a:solidFill>
+                  <a:srgbClr val="000000"/>
+                </a:solidFill>
+              </a:rPr>
+              <a:t>Parameters like date, title</a:t>
+            </a:r>
+          </a:p>
+          <a:p>
+            <a:pPr marL="285750" indent="-285750">
+              <a:buFont typeface="Arial"/>
+              <a:buChar char="•"/>
+              <a:defRPr/>
+            </a:pPr>
+            <a:endParaRPr lang="de-DE" sz="1400" i="1" dirty="0">
+              <a:solidFill>
+                <a:srgbClr val="000000"/>
+              </a:solidFill>
+              <a:latin typeface="Times New Roman" pitchFamily="-107" charset="0"/>
+            </a:endParaRPr>
+          </a:p>
+        </p:txBody>
+      </p:sp>
+      <p:sp>
+        <p:nvSpPr>
+          <p:cNvPr id="18" name="Text Box 10">
+            <a:extLst>
+              <a:ext uri="{FF2B5EF4-FFF2-40B4-BE49-F238E27FC236}">
+                <a16:creationId xmlns:a16="http://schemas.microsoft.com/office/drawing/2014/main" id="{0EDF7FD2-14F7-41EE-8FF0-622E0799923D}"/>
               </a:ext>
             </a:extLst>
           </p:cNvPr>
@@ -4579,8 +4705,8 @@
         </p:nvSpPr>
         <p:spPr bwMode="auto">
           <a:xfrm>
-            <a:off x="442116" y="10750085"/>
-            <a:ext cx="4580551" cy="338554"/>
+            <a:off x="442119" y="8688116"/>
+            <a:ext cx="4580551" cy="360000"/>
           </a:xfrm>
           <a:prstGeom prst="rect">
             <a:avLst/>
@@ -4621,17 +4747,17 @@
             </a:pPr>
             <a:r>
               <a:rPr lang="fr-FR" sz="1600" noProof="1"/>
-              <a:t>entry: Observation</a:t>
-            </a:r>
-          </a:p>
-        </p:txBody>
-      </p:sp>
-      <p:sp>
-        <p:nvSpPr>
-          <p:cNvPr id="16" name="Text Box 10">
+              <a:t>entry: …</a:t>
+            </a:r>
+          </a:p>
+        </p:txBody>
+      </p:sp>
+      <p:sp>
+        <p:nvSpPr>
+          <p:cNvPr id="19" name="Text Box 10">
             <a:extLst>
               <a:ext uri="{FF2B5EF4-FFF2-40B4-BE49-F238E27FC236}">
-                <a16:creationId xmlns:a16="http://schemas.microsoft.com/office/drawing/2014/main" id="{A1E94DDC-9D5C-4D8C-A306-342496404C16}"/>
+                <a16:creationId xmlns:a16="http://schemas.microsoft.com/office/drawing/2014/main" id="{BC7ED967-E7BE-4DDB-9E3A-FC45C073BE32}"/>
               </a:ext>
             </a:extLst>
           </p:cNvPr>
@@ -4642,8 +4768,134 @@
         </p:nvSpPr>
         <p:spPr bwMode="auto">
           <a:xfrm>
-            <a:off x="613408" y="1984066"/>
-            <a:ext cx="4184753" cy="338554"/>
+            <a:off x="442119" y="7284385"/>
+            <a:ext cx="4580551" cy="360000"/>
+          </a:xfrm>
+          <a:prstGeom prst="rect">
+            <a:avLst/>
+          </a:prstGeom>
+          <a:ln>
+            <a:headEnd/>
+            <a:tailEnd/>
+          </a:ln>
+        </p:spPr>
+        <p:style>
+          <a:lnRef idx="0">
+            <a:schemeClr val="accent2"/>
+          </a:lnRef>
+          <a:fillRef idx="3">
+            <a:schemeClr val="accent2"/>
+          </a:fillRef>
+          <a:effectRef idx="3">
+            <a:schemeClr val="accent2"/>
+          </a:effectRef>
+          <a:fontRef idx="minor">
+            <a:schemeClr val="lt1"/>
+          </a:fontRef>
+        </p:style>
+        <p:txBody>
+          <a:bodyPr wrap="square">
+            <a:spAutoFit/>
+          </a:bodyPr>
+          <a:lstStyle/>
+          <a:p>
+            <a:pPr>
+              <a:spcBef>
+                <a:spcPts val="300"/>
+              </a:spcBef>
+              <a:spcAft>
+                <a:spcPts val="300"/>
+              </a:spcAft>
+              <a:defRPr/>
+            </a:pPr>
+            <a:r>
+              <a:rPr lang="fr-FR" sz="1600" noProof="1"/>
+              <a:t>entry: Patient</a:t>
+            </a:r>
+          </a:p>
+        </p:txBody>
+      </p:sp>
+      <p:sp>
+        <p:nvSpPr>
+          <p:cNvPr id="20" name="Text Box 10">
+            <a:extLst>
+              <a:ext uri="{FF2B5EF4-FFF2-40B4-BE49-F238E27FC236}">
+                <a16:creationId xmlns:a16="http://schemas.microsoft.com/office/drawing/2014/main" id="{4B162922-1DAC-4492-AE7D-DBFFAE207967}"/>
+              </a:ext>
+            </a:extLst>
+          </p:cNvPr>
+          <p:cNvSpPr txBox="1">
+            <a:spLocks noChangeArrowheads="1"/>
+          </p:cNvSpPr>
+          <p:nvPr/>
+        </p:nvSpPr>
+        <p:spPr bwMode="auto">
+          <a:xfrm>
+            <a:off x="442115" y="7748435"/>
+            <a:ext cx="4580551" cy="360000"/>
+          </a:xfrm>
+          <a:prstGeom prst="rect">
+            <a:avLst/>
+          </a:prstGeom>
+          <a:ln>
+            <a:headEnd/>
+            <a:tailEnd/>
+          </a:ln>
+        </p:spPr>
+        <p:style>
+          <a:lnRef idx="0">
+            <a:schemeClr val="accent2"/>
+          </a:lnRef>
+          <a:fillRef idx="3">
+            <a:schemeClr val="accent2"/>
+          </a:fillRef>
+          <a:effectRef idx="3">
+            <a:schemeClr val="accent2"/>
+          </a:effectRef>
+          <a:fontRef idx="minor">
+            <a:schemeClr val="lt1"/>
+          </a:fontRef>
+        </p:style>
+        <p:txBody>
+          <a:bodyPr wrap="square">
+            <a:spAutoFit/>
+          </a:bodyPr>
+          <a:lstStyle/>
+          <a:p>
+            <a:pPr>
+              <a:spcBef>
+                <a:spcPts val="300"/>
+              </a:spcBef>
+              <a:spcAft>
+                <a:spcPts val="300"/>
+              </a:spcAft>
+              <a:defRPr/>
+            </a:pPr>
+            <a:r>
+              <a:rPr lang="fr-FR" sz="1600" noProof="1"/>
+              <a:t>entry: Encounter</a:t>
+            </a:r>
+          </a:p>
+        </p:txBody>
+      </p:sp>
+      <p:sp>
+        <p:nvSpPr>
+          <p:cNvPr id="3" name="Text Box 10">
+            <a:extLst>
+              <a:ext uri="{FF2B5EF4-FFF2-40B4-BE49-F238E27FC236}">
+                <a16:creationId xmlns:a16="http://schemas.microsoft.com/office/drawing/2014/main" id="{94221EAD-5B73-8094-84F0-F473789383FB}"/>
+              </a:ext>
+            </a:extLst>
+          </p:cNvPr>
+          <p:cNvSpPr txBox="1">
+            <a:spLocks noChangeArrowheads="1"/>
+          </p:cNvSpPr>
+          <p:nvPr/>
+        </p:nvSpPr>
+        <p:spPr bwMode="auto">
+          <a:xfrm>
+            <a:off x="613408" y="2931509"/>
+            <a:ext cx="4184753" cy="1277671"/>
           </a:xfrm>
           <a:prstGeom prst="rect">
             <a:avLst/>
@@ -4669,7 +4921,7 @@
         </p:style>
         <p:txBody>
           <a:bodyPr wrap="square">
-            <a:spAutoFit/>
+            <a:noAutofit/>
           </a:bodyPr>
           <a:lstStyle/>
           <a:p>
@@ -4688,7 +4940,7 @@
                   <a:schemeClr val="tx1"/>
                 </a:solidFill>
               </a:rPr>
-              <a:t>Document Author</a:t>
+              <a:t>Core Data </a:t>
             </a:r>
             <a:r>
               <a:rPr lang="fr-FR" sz="1600" noProof="1">
@@ -4696,74 +4948,17 @@
                   <a:schemeClr val="tx1"/>
                 </a:solidFill>
               </a:rPr>
-              <a:t> (Reference)</a:t>
-            </a:r>
-          </a:p>
-        </p:txBody>
-      </p:sp>
-      <p:sp>
-        <p:nvSpPr>
-          <p:cNvPr id="17" name="Textfeld 16">
+              <a:t>(Section)</a:t>
+            </a:r>
+          </a:p>
+        </p:txBody>
+      </p:sp>
+      <p:sp>
+        <p:nvSpPr>
+          <p:cNvPr id="7" name="Text Box 10">
             <a:extLst>
               <a:ext uri="{FF2B5EF4-FFF2-40B4-BE49-F238E27FC236}">
-                <a16:creationId xmlns:a16="http://schemas.microsoft.com/office/drawing/2014/main" id="{B39AD430-D951-4118-B787-96FF87B0655A}"/>
-              </a:ext>
-            </a:extLst>
-          </p:cNvPr>
-          <p:cNvSpPr txBox="1"/>
-          <p:nvPr/>
-        </p:nvSpPr>
-        <p:spPr>
-          <a:xfrm>
-            <a:off x="561774" y="1238870"/>
-            <a:ext cx="3318851" cy="523220"/>
-          </a:xfrm>
-          <a:prstGeom prst="rect">
-            <a:avLst/>
-          </a:prstGeom>
-          <a:noFill/>
-        </p:spPr>
-        <p:txBody>
-          <a:bodyPr wrap="square" rtlCol="0">
-            <a:spAutoFit/>
-          </a:bodyPr>
-          <a:lstStyle/>
-          <a:p>
-            <a:pPr marL="285750" indent="-285750">
-              <a:buFont typeface="Arial"/>
-              <a:buChar char="•"/>
-              <a:defRPr/>
-            </a:pPr>
-            <a:r>
-              <a:rPr lang="de-DE" sz="1400" i="1" dirty="0">
-                <a:solidFill>
-                  <a:srgbClr val="000000"/>
-                </a:solidFill>
-              </a:rPr>
-              <a:t>Parameters like date, title</a:t>
-            </a:r>
-          </a:p>
-          <a:p>
-            <a:pPr marL="285750" indent="-285750">
-              <a:buFont typeface="Arial"/>
-              <a:buChar char="•"/>
-              <a:defRPr/>
-            </a:pPr>
-            <a:endParaRPr lang="de-DE" sz="1400" i="1" dirty="0">
-              <a:solidFill>
-                <a:srgbClr val="000000"/>
-              </a:solidFill>
-              <a:latin typeface="Times New Roman" pitchFamily="-107" charset="0"/>
-            </a:endParaRPr>
-          </a:p>
-        </p:txBody>
-      </p:sp>
-      <p:sp>
-        <p:nvSpPr>
-          <p:cNvPr id="18" name="Text Box 10">
-            <a:extLst>
-              <a:ext uri="{FF2B5EF4-FFF2-40B4-BE49-F238E27FC236}">
-                <a16:creationId xmlns:a16="http://schemas.microsoft.com/office/drawing/2014/main" id="{0EDF7FD2-14F7-41EE-8FF0-622E0799923D}"/>
+                <a16:creationId xmlns:a16="http://schemas.microsoft.com/office/drawing/2014/main" id="{B7C5E9BD-368B-FC59-2447-692676D4E7C1}"/>
               </a:ext>
             </a:extLst>
           </p:cNvPr>
@@ -4774,197 +4969,8 @@
         </p:nvSpPr>
         <p:spPr bwMode="auto">
           <a:xfrm>
-            <a:off x="442115" y="11182911"/>
-            <a:ext cx="4580551" cy="338554"/>
-          </a:xfrm>
-          <a:prstGeom prst="rect">
-            <a:avLst/>
-          </a:prstGeom>
-          <a:ln>
-            <a:headEnd/>
-            <a:tailEnd/>
-          </a:ln>
-        </p:spPr>
-        <p:style>
-          <a:lnRef idx="0">
-            <a:schemeClr val="accent2"/>
-          </a:lnRef>
-          <a:fillRef idx="3">
-            <a:schemeClr val="accent2"/>
-          </a:fillRef>
-          <a:effectRef idx="3">
-            <a:schemeClr val="accent2"/>
-          </a:effectRef>
-          <a:fontRef idx="minor">
-            <a:schemeClr val="lt1"/>
-          </a:fontRef>
-        </p:style>
-        <p:txBody>
-          <a:bodyPr wrap="square">
-            <a:spAutoFit/>
-          </a:bodyPr>
-          <a:lstStyle/>
-          <a:p>
-            <a:pPr>
-              <a:spcBef>
-                <a:spcPts val="300"/>
-              </a:spcBef>
-              <a:spcAft>
-                <a:spcPts val="300"/>
-              </a:spcAft>
-              <a:defRPr/>
-            </a:pPr>
-            <a:r>
-              <a:rPr lang="fr-FR" sz="1600" noProof="1"/>
-              <a:t>entry: …</a:t>
-            </a:r>
-          </a:p>
-        </p:txBody>
-      </p:sp>
-      <p:sp>
-        <p:nvSpPr>
-          <p:cNvPr id="19" name="Text Box 10">
-            <a:extLst>
-              <a:ext uri="{FF2B5EF4-FFF2-40B4-BE49-F238E27FC236}">
-                <a16:creationId xmlns:a16="http://schemas.microsoft.com/office/drawing/2014/main" id="{BC7ED967-E7BE-4DDB-9E3A-FC45C073BE32}"/>
-              </a:ext>
-            </a:extLst>
-          </p:cNvPr>
-          <p:cNvSpPr txBox="1">
-            <a:spLocks noChangeArrowheads="1"/>
-          </p:cNvSpPr>
-          <p:nvPr/>
-        </p:nvSpPr>
-        <p:spPr bwMode="auto">
-          <a:xfrm>
-            <a:off x="442117" y="9874018"/>
-            <a:ext cx="4580551" cy="338554"/>
-          </a:xfrm>
-          <a:prstGeom prst="rect">
-            <a:avLst/>
-          </a:prstGeom>
-          <a:ln>
-            <a:headEnd/>
-            <a:tailEnd/>
-          </a:ln>
-        </p:spPr>
-        <p:style>
-          <a:lnRef idx="0">
-            <a:schemeClr val="accent2"/>
-          </a:lnRef>
-          <a:fillRef idx="3">
-            <a:schemeClr val="accent2"/>
-          </a:fillRef>
-          <a:effectRef idx="3">
-            <a:schemeClr val="accent2"/>
-          </a:effectRef>
-          <a:fontRef idx="minor">
-            <a:schemeClr val="lt1"/>
-          </a:fontRef>
-        </p:style>
-        <p:txBody>
-          <a:bodyPr wrap="square">
-            <a:spAutoFit/>
-          </a:bodyPr>
-          <a:lstStyle/>
-          <a:p>
-            <a:pPr>
-              <a:spcBef>
-                <a:spcPts val="300"/>
-              </a:spcBef>
-              <a:spcAft>
-                <a:spcPts val="300"/>
-              </a:spcAft>
-              <a:defRPr/>
-            </a:pPr>
-            <a:r>
-              <a:rPr lang="fr-FR" sz="1600" noProof="1"/>
-              <a:t>entry: Patient</a:t>
-            </a:r>
-          </a:p>
-        </p:txBody>
-      </p:sp>
-      <p:sp>
-        <p:nvSpPr>
-          <p:cNvPr id="20" name="Text Box 10">
-            <a:extLst>
-              <a:ext uri="{FF2B5EF4-FFF2-40B4-BE49-F238E27FC236}">
-                <a16:creationId xmlns:a16="http://schemas.microsoft.com/office/drawing/2014/main" id="{4B162922-1DAC-4492-AE7D-DBFFAE207967}"/>
-              </a:ext>
-            </a:extLst>
-          </p:cNvPr>
-          <p:cNvSpPr txBox="1">
-            <a:spLocks noChangeArrowheads="1"/>
-          </p:cNvSpPr>
-          <p:nvPr/>
-        </p:nvSpPr>
-        <p:spPr bwMode="auto">
-          <a:xfrm>
-            <a:off x="442117" y="10317260"/>
-            <a:ext cx="4580551" cy="338554"/>
-          </a:xfrm>
-          <a:prstGeom prst="rect">
-            <a:avLst/>
-          </a:prstGeom>
-          <a:ln>
-            <a:headEnd/>
-            <a:tailEnd/>
-          </a:ln>
-        </p:spPr>
-        <p:style>
-          <a:lnRef idx="0">
-            <a:schemeClr val="accent2"/>
-          </a:lnRef>
-          <a:fillRef idx="3">
-            <a:schemeClr val="accent2"/>
-          </a:fillRef>
-          <a:effectRef idx="3">
-            <a:schemeClr val="accent2"/>
-          </a:effectRef>
-          <a:fontRef idx="minor">
-            <a:schemeClr val="lt1"/>
-          </a:fontRef>
-        </p:style>
-        <p:txBody>
-          <a:bodyPr wrap="square">
-            <a:spAutoFit/>
-          </a:bodyPr>
-          <a:lstStyle/>
-          <a:p>
-            <a:pPr>
-              <a:spcBef>
-                <a:spcPts val="300"/>
-              </a:spcBef>
-              <a:spcAft>
-                <a:spcPts val="300"/>
-              </a:spcAft>
-              <a:defRPr/>
-            </a:pPr>
-            <a:r>
-              <a:rPr lang="fr-FR" sz="1600" noProof="1"/>
-              <a:t>entry: Encounter</a:t>
-            </a:r>
-          </a:p>
-        </p:txBody>
-      </p:sp>
-      <p:sp>
-        <p:nvSpPr>
-          <p:cNvPr id="3" name="Text Box 10">
-            <a:extLst>
-              <a:ext uri="{FF2B5EF4-FFF2-40B4-BE49-F238E27FC236}">
-                <a16:creationId xmlns:a16="http://schemas.microsoft.com/office/drawing/2014/main" id="{94221EAD-5B73-8094-84F0-F473789383FB}"/>
-              </a:ext>
-            </a:extLst>
-          </p:cNvPr>
-          <p:cNvSpPr txBox="1">
-            <a:spLocks noChangeArrowheads="1"/>
-          </p:cNvSpPr>
-          <p:nvPr/>
-        </p:nvSpPr>
-        <p:spPr bwMode="auto">
-          <a:xfrm>
-            <a:off x="613408" y="3292792"/>
-            <a:ext cx="4184753" cy="828000"/>
+            <a:off x="613408" y="4298734"/>
+            <a:ext cx="4184753" cy="2220875"/>
           </a:xfrm>
           <a:prstGeom prst="rect">
             <a:avLst/>
@@ -5009,7 +5015,7 @@
                   <a:schemeClr val="tx1"/>
                 </a:solidFill>
               </a:rPr>
-              <a:t>Care Team</a:t>
+              <a:t>Lab Subsections</a:t>
             </a:r>
             <a:r>
               <a:rPr lang="fr-FR" sz="1600" noProof="1">
@@ -5024,10 +5030,10 @@
       </p:sp>
       <p:sp>
         <p:nvSpPr>
-          <p:cNvPr id="6" name="Text Box 10">
+          <p:cNvPr id="8" name="Text Box 10">
             <a:extLst>
               <a:ext uri="{FF2B5EF4-FFF2-40B4-BE49-F238E27FC236}">
-                <a16:creationId xmlns:a16="http://schemas.microsoft.com/office/drawing/2014/main" id="{2881DCBC-1EDC-2BAD-D39C-B08A982555B0}"/>
+                <a16:creationId xmlns:a16="http://schemas.microsoft.com/office/drawing/2014/main" id="{47109A44-9E42-7D61-46E5-2369154A4EB6}"/>
               </a:ext>
             </a:extLst>
           </p:cNvPr>
@@ -5038,8 +5044,8 @@
         </p:nvSpPr>
         <p:spPr bwMode="auto">
           <a:xfrm>
-            <a:off x="757646" y="3639881"/>
-            <a:ext cx="3845730" cy="338554"/>
+            <a:off x="766612" y="4671612"/>
+            <a:ext cx="3845730" cy="360000"/>
           </a:xfrm>
           <a:prstGeom prst="rect">
             <a:avLst/>
@@ -5084,7 +5090,7 @@
                   <a:schemeClr val="tx1"/>
                 </a:solidFill>
               </a:rPr>
-              <a:t>PractitionerRole</a:t>
+              <a:t>Blood Bank Studies</a:t>
             </a:r>
             <a:r>
               <a:rPr lang="fr-FR" sz="1600" noProof="1">
@@ -5092,17 +5098,33 @@
                   <a:schemeClr val="tx1"/>
                 </a:solidFill>
               </a:rPr>
-              <a:t> (Reference)</a:t>
-            </a:r>
-          </a:p>
-        </p:txBody>
-      </p:sp>
-      <p:sp>
-        <p:nvSpPr>
-          <p:cNvPr id="7" name="Text Box 10">
+              <a:t> (Section)</a:t>
+            </a:r>
+          </a:p>
+          <a:p>
+            <a:pPr>
+              <a:spcBef>
+                <a:spcPts val="300"/>
+              </a:spcBef>
+              <a:spcAft>
+                <a:spcPts val="300"/>
+              </a:spcAft>
+              <a:defRPr/>
+            </a:pPr>
+            <a:endParaRPr lang="fr-FR" sz="1600" noProof="1">
+              <a:solidFill>
+                <a:schemeClr val="tx1"/>
+              </a:solidFill>
+            </a:endParaRPr>
+          </a:p>
+        </p:txBody>
+      </p:sp>
+      <p:sp>
+        <p:nvSpPr>
+          <p:cNvPr id="14" name="Text Box 10">
             <a:extLst>
               <a:ext uri="{FF2B5EF4-FFF2-40B4-BE49-F238E27FC236}">
-                <a16:creationId xmlns:a16="http://schemas.microsoft.com/office/drawing/2014/main" id="{B7C5E9BD-368B-FC59-2447-692676D4E7C1}"/>
+                <a16:creationId xmlns:a16="http://schemas.microsoft.com/office/drawing/2014/main" id="{FAB65AD3-60E1-C3A7-824B-D1EC4A345A22}"/>
               </a:ext>
             </a:extLst>
           </p:cNvPr>
@@ -5113,8 +5135,8 @@
         </p:nvSpPr>
         <p:spPr bwMode="auto">
           <a:xfrm>
-            <a:off x="613408" y="4193512"/>
-            <a:ext cx="4184753" cy="4050695"/>
+            <a:off x="771095" y="5122592"/>
+            <a:ext cx="3845730" cy="360000"/>
           </a:xfrm>
           <a:prstGeom prst="rect">
             <a:avLst/>
@@ -5140,7 +5162,7 @@
         </p:style>
         <p:txBody>
           <a:bodyPr wrap="square">
-            <a:noAutofit/>
+            <a:spAutoFit/>
           </a:bodyPr>
           <a:lstStyle/>
           <a:p>
@@ -5159,7 +5181,7 @@
                   <a:schemeClr val="tx1"/>
                 </a:solidFill>
               </a:rPr>
-              <a:t>Lab Subsections</a:t>
+              <a:t>Chemistry Studies</a:t>
             </a:r>
             <a:r>
               <a:rPr lang="fr-FR" sz="1600" noProof="1">
@@ -5170,14 +5192,46 @@
               <a:t> (Section)</a:t>
             </a:r>
           </a:p>
-        </p:txBody>
-      </p:sp>
-      <p:sp>
-        <p:nvSpPr>
-          <p:cNvPr id="8" name="Text Box 10">
+          <a:p>
+            <a:pPr>
+              <a:spcBef>
+                <a:spcPts val="300"/>
+              </a:spcBef>
+              <a:spcAft>
+                <a:spcPts val="300"/>
+              </a:spcAft>
+              <a:defRPr/>
+            </a:pPr>
+            <a:endParaRPr lang="fr-FR" sz="1600" noProof="1">
+              <a:solidFill>
+                <a:schemeClr val="tx1"/>
+              </a:solidFill>
+            </a:endParaRPr>
+          </a:p>
+          <a:p>
+            <a:pPr>
+              <a:spcBef>
+                <a:spcPts val="300"/>
+              </a:spcBef>
+              <a:spcAft>
+                <a:spcPts val="300"/>
+              </a:spcAft>
+              <a:defRPr/>
+            </a:pPr>
+            <a:endParaRPr lang="fr-FR" sz="1600" noProof="1">
+              <a:solidFill>
+                <a:schemeClr val="tx1"/>
+              </a:solidFill>
+            </a:endParaRPr>
+          </a:p>
+        </p:txBody>
+      </p:sp>
+      <p:sp>
+        <p:nvSpPr>
+          <p:cNvPr id="22" name="Text Box 10">
             <a:extLst>
               <a:ext uri="{FF2B5EF4-FFF2-40B4-BE49-F238E27FC236}">
-                <a16:creationId xmlns:a16="http://schemas.microsoft.com/office/drawing/2014/main" id="{47109A44-9E42-7D61-46E5-2369154A4EB6}"/>
+                <a16:creationId xmlns:a16="http://schemas.microsoft.com/office/drawing/2014/main" id="{8E26439A-0504-C6AF-EE33-2E1027F86FCC}"/>
               </a:ext>
             </a:extLst>
           </p:cNvPr>
@@ -5188,8 +5242,8 @@
         </p:nvSpPr>
         <p:spPr bwMode="auto">
           <a:xfrm>
-            <a:off x="755806" y="4538246"/>
-            <a:ext cx="3845730" cy="828000"/>
+            <a:off x="771095" y="5567951"/>
+            <a:ext cx="3845730" cy="360000"/>
           </a:xfrm>
           <a:prstGeom prst="rect">
             <a:avLst/>
@@ -5234,7 +5288,7 @@
                   <a:schemeClr val="tx1"/>
                 </a:solidFill>
               </a:rPr>
-              <a:t>Blood Bank Studies</a:t>
+              <a:t>Hematology Studies </a:t>
             </a:r>
             <a:r>
               <a:rPr lang="fr-FR" sz="1600" noProof="1">
@@ -5242,7 +5296,7 @@
                   <a:schemeClr val="tx1"/>
                 </a:solidFill>
               </a:rPr>
-              <a:t> (Section)</a:t>
+              <a:t>(Section)</a:t>
             </a:r>
           </a:p>
           <a:p>
@@ -5261,14 +5315,30 @@
               </a:solidFill>
             </a:endParaRPr>
           </a:p>
-        </p:txBody>
-      </p:sp>
-      <p:sp>
-        <p:nvSpPr>
-          <p:cNvPr id="10" name="Text Box 10">
+          <a:p>
+            <a:pPr>
+              <a:spcBef>
+                <a:spcPts val="300"/>
+              </a:spcBef>
+              <a:spcAft>
+                <a:spcPts val="300"/>
+              </a:spcAft>
+              <a:defRPr/>
+            </a:pPr>
+            <a:endParaRPr lang="fr-FR" sz="1600" noProof="1">
+              <a:solidFill>
+                <a:schemeClr val="tx1"/>
+              </a:solidFill>
+            </a:endParaRPr>
+          </a:p>
+        </p:txBody>
+      </p:sp>
+      <p:sp>
+        <p:nvSpPr>
+          <p:cNvPr id="25" name="Text Box 10">
             <a:extLst>
               <a:ext uri="{FF2B5EF4-FFF2-40B4-BE49-F238E27FC236}">
-                <a16:creationId xmlns:a16="http://schemas.microsoft.com/office/drawing/2014/main" id="{DB469172-B577-CBCD-A3E9-F4BC07C3A45C}"/>
+                <a16:creationId xmlns:a16="http://schemas.microsoft.com/office/drawing/2014/main" id="{23106D7F-BC60-BEBC-F106-CF13279D7A33}"/>
               </a:ext>
             </a:extLst>
           </p:cNvPr>
@@ -5279,8 +5349,8 @@
         </p:nvSpPr>
         <p:spPr bwMode="auto">
           <a:xfrm>
-            <a:off x="901884" y="4895207"/>
-            <a:ext cx="3553575" cy="338554"/>
+            <a:off x="771095" y="6020754"/>
+            <a:ext cx="3845730" cy="360000"/>
           </a:xfrm>
           <a:prstGeom prst="rect">
             <a:avLst/>
@@ -5325,7 +5395,7 @@
                   <a:schemeClr val="tx1"/>
                 </a:solidFill>
               </a:rPr>
-              <a:t>Observation</a:t>
+              <a:t>Microbiology Studies </a:t>
             </a:r>
             <a:r>
               <a:rPr lang="fr-FR" sz="1600" noProof="1">
@@ -5333,17 +5403,49 @@
                   <a:schemeClr val="tx1"/>
                 </a:solidFill>
               </a:rPr>
-              <a:t> (Reference)</a:t>
-            </a:r>
-          </a:p>
-        </p:txBody>
-      </p:sp>
-      <p:sp>
-        <p:nvSpPr>
-          <p:cNvPr id="14" name="Text Box 10">
+              <a:t>(Section)</a:t>
+            </a:r>
+          </a:p>
+          <a:p>
+            <a:pPr>
+              <a:spcBef>
+                <a:spcPts val="300"/>
+              </a:spcBef>
+              <a:spcAft>
+                <a:spcPts val="300"/>
+              </a:spcAft>
+              <a:defRPr/>
+            </a:pPr>
+            <a:endParaRPr lang="fr-FR" sz="1600" noProof="1">
+              <a:solidFill>
+                <a:schemeClr val="tx1"/>
+              </a:solidFill>
+            </a:endParaRPr>
+          </a:p>
+          <a:p>
+            <a:pPr>
+              <a:spcBef>
+                <a:spcPts val="300"/>
+              </a:spcBef>
+              <a:spcAft>
+                <a:spcPts val="300"/>
+              </a:spcAft>
+              <a:defRPr/>
+            </a:pPr>
+            <a:endParaRPr lang="fr-FR" sz="1600" noProof="1">
+              <a:solidFill>
+                <a:schemeClr val="tx1"/>
+              </a:solidFill>
+            </a:endParaRPr>
+          </a:p>
+        </p:txBody>
+      </p:sp>
+      <p:sp>
+        <p:nvSpPr>
+          <p:cNvPr id="28" name="Text Box 10">
             <a:extLst>
               <a:ext uri="{FF2B5EF4-FFF2-40B4-BE49-F238E27FC236}">
-                <a16:creationId xmlns:a16="http://schemas.microsoft.com/office/drawing/2014/main" id="{FAB65AD3-60E1-C3A7-824B-D1EC4A345A22}"/>
+                <a16:creationId xmlns:a16="http://schemas.microsoft.com/office/drawing/2014/main" id="{1E74D67D-A0F2-5934-45CA-AFB3E59E4DEB}"/>
               </a:ext>
             </a:extLst>
           </p:cNvPr>
@@ -5354,8 +5456,8 @@
         </p:nvSpPr>
         <p:spPr bwMode="auto">
           <a:xfrm>
-            <a:off x="762129" y="5465415"/>
-            <a:ext cx="3845730" cy="828000"/>
+            <a:off x="613408" y="6610589"/>
+            <a:ext cx="4184753" cy="360000"/>
           </a:xfrm>
           <a:prstGeom prst="rect">
             <a:avLst/>
@@ -5381,7 +5483,7 @@
         </p:style>
         <p:txBody>
           <a:bodyPr wrap="square">
-            <a:spAutoFit/>
+            <a:noAutofit/>
           </a:bodyPr>
           <a:lstStyle/>
           <a:p>
@@ -5400,7 +5502,7 @@
                   <a:schemeClr val="tx1"/>
                 </a:solidFill>
               </a:rPr>
-              <a:t>Chemistry Studies</a:t>
+              <a:t>Pregnancy Progress </a:t>
             </a:r>
             <a:r>
               <a:rPr lang="fr-FR" sz="1600" noProof="1">
@@ -5408,7 +5510,82 @@
                   <a:schemeClr val="tx1"/>
                 </a:solidFill>
               </a:rPr>
-              <a:t> (Section)</a:t>
+              <a:t>(Section)</a:t>
+            </a:r>
+          </a:p>
+        </p:txBody>
+      </p:sp>
+      <p:sp>
+        <p:nvSpPr>
+          <p:cNvPr id="33" name="Text Box 10">
+            <a:extLst>
+              <a:ext uri="{FF2B5EF4-FFF2-40B4-BE49-F238E27FC236}">
+                <a16:creationId xmlns:a16="http://schemas.microsoft.com/office/drawing/2014/main" id="{5047DE20-87C1-060F-360C-D4F1AC6E8C7C}"/>
+              </a:ext>
+            </a:extLst>
+          </p:cNvPr>
+          <p:cNvSpPr txBox="1">
+            <a:spLocks noChangeArrowheads="1"/>
+          </p:cNvSpPr>
+          <p:nvPr/>
+        </p:nvSpPr>
+        <p:spPr bwMode="auto">
+          <a:xfrm>
+            <a:off x="771095" y="3271204"/>
+            <a:ext cx="3845730" cy="360000"/>
+          </a:xfrm>
+          <a:prstGeom prst="rect">
+            <a:avLst/>
+          </a:prstGeom>
+          <a:ln>
+            <a:headEnd/>
+            <a:tailEnd/>
+          </a:ln>
+        </p:spPr>
+        <p:style>
+          <a:lnRef idx="0">
+            <a:schemeClr val="accent3"/>
+          </a:lnRef>
+          <a:fillRef idx="3">
+            <a:schemeClr val="accent3"/>
+          </a:fillRef>
+          <a:effectRef idx="3">
+            <a:schemeClr val="accent3"/>
+          </a:effectRef>
+          <a:fontRef idx="minor">
+            <a:schemeClr val="lt1"/>
+          </a:fontRef>
+        </p:style>
+        <p:txBody>
+          <a:bodyPr wrap="square">
+            <a:spAutoFit/>
+          </a:bodyPr>
+          <a:lstStyle/>
+          <a:p>
+            <a:pPr>
+              <a:spcBef>
+                <a:spcPts val="300"/>
+              </a:spcBef>
+              <a:spcAft>
+                <a:spcPts val="300"/>
+              </a:spcAft>
+              <a:defRPr/>
+            </a:pPr>
+            <a:r>
+              <a:rPr lang="fr-FR" sz="1600" b="1" noProof="1">
+                <a:solidFill>
+                  <a:schemeClr val="tx1"/>
+                </a:solidFill>
+              </a:rPr>
+              <a:t>Parent </a:t>
+            </a:r>
+            <a:r>
+              <a:rPr lang="fr-FR" sz="1600" noProof="1">
+                <a:solidFill>
+                  <a:schemeClr val="tx1"/>
+                </a:solidFill>
+              </a:rPr>
+              <a:t>(Section)</a:t>
             </a:r>
           </a:p>
           <a:p>
@@ -5427,6 +5604,81 @@
               </a:solidFill>
             </a:endParaRPr>
           </a:p>
+        </p:txBody>
+      </p:sp>
+      <p:sp>
+        <p:nvSpPr>
+          <p:cNvPr id="37" name="Text Box 10">
+            <a:extLst>
+              <a:ext uri="{FF2B5EF4-FFF2-40B4-BE49-F238E27FC236}">
+                <a16:creationId xmlns:a16="http://schemas.microsoft.com/office/drawing/2014/main" id="{03EAB17E-392A-1217-4D0D-4BA502FEA8BA}"/>
+              </a:ext>
+            </a:extLst>
+          </p:cNvPr>
+          <p:cNvSpPr txBox="1">
+            <a:spLocks noChangeArrowheads="1"/>
+          </p:cNvSpPr>
+          <p:nvPr/>
+        </p:nvSpPr>
+        <p:spPr bwMode="auto">
+          <a:xfrm>
+            <a:off x="768452" y="3730486"/>
+            <a:ext cx="3845730" cy="360000"/>
+          </a:xfrm>
+          <a:prstGeom prst="rect">
+            <a:avLst/>
+          </a:prstGeom>
+          <a:ln>
+            <a:headEnd/>
+            <a:tailEnd/>
+          </a:ln>
+        </p:spPr>
+        <p:style>
+          <a:lnRef idx="0">
+            <a:schemeClr val="accent3"/>
+          </a:lnRef>
+          <a:fillRef idx="3">
+            <a:schemeClr val="accent3"/>
+          </a:fillRef>
+          <a:effectRef idx="3">
+            <a:schemeClr val="accent3"/>
+          </a:effectRef>
+          <a:fontRef idx="minor">
+            <a:schemeClr val="lt1"/>
+          </a:fontRef>
+        </p:style>
+        <p:txBody>
+          <a:bodyPr wrap="square">
+            <a:spAutoFit/>
+          </a:bodyPr>
+          <a:lstStyle/>
+          <a:p>
+            <a:pPr>
+              <a:spcBef>
+                <a:spcPts val="300"/>
+              </a:spcBef>
+              <a:spcAft>
+                <a:spcPts val="300"/>
+              </a:spcAft>
+              <a:defRPr/>
+            </a:pPr>
+            <a:r>
+              <a:rPr lang="fr-FR" sz="1600" b="1" noProof="1">
+                <a:solidFill>
+                  <a:schemeClr val="tx1"/>
+                </a:solidFill>
+              </a:rPr>
+              <a:t>Care Team </a:t>
+            </a:r>
+            <a:r>
+              <a:rPr lang="fr-FR" sz="1600" noProof="1">
+                <a:solidFill>
+                  <a:schemeClr val="tx1"/>
+                </a:solidFill>
+              </a:rPr>
+              <a:t>(Section)</a:t>
+            </a:r>
+          </a:p>
           <a:p>
             <a:pPr>
               <a:spcBef>
@@ -5442,670 +5694,6 @@
                 <a:schemeClr val="tx1"/>
               </a:solidFill>
             </a:endParaRPr>
-          </a:p>
-        </p:txBody>
-      </p:sp>
-      <p:sp>
-        <p:nvSpPr>
-          <p:cNvPr id="21" name="Text Box 10">
-            <a:extLst>
-              <a:ext uri="{FF2B5EF4-FFF2-40B4-BE49-F238E27FC236}">
-                <a16:creationId xmlns:a16="http://schemas.microsoft.com/office/drawing/2014/main" id="{D743601B-202B-2289-11C2-6BC77F901E8D}"/>
-              </a:ext>
-            </a:extLst>
-          </p:cNvPr>
-          <p:cNvSpPr txBox="1">
-            <a:spLocks noChangeArrowheads="1"/>
-          </p:cNvSpPr>
-          <p:nvPr/>
-        </p:nvSpPr>
-        <p:spPr bwMode="auto">
-          <a:xfrm>
-            <a:off x="901883" y="5821395"/>
-            <a:ext cx="3553575" cy="338554"/>
-          </a:xfrm>
-          <a:prstGeom prst="rect">
-            <a:avLst/>
-          </a:prstGeom>
-          <a:ln>
-            <a:headEnd/>
-            <a:tailEnd/>
-          </a:ln>
-        </p:spPr>
-        <p:style>
-          <a:lnRef idx="0">
-            <a:schemeClr val="accent3"/>
-          </a:lnRef>
-          <a:fillRef idx="3">
-            <a:schemeClr val="accent3"/>
-          </a:fillRef>
-          <a:effectRef idx="3">
-            <a:schemeClr val="accent3"/>
-          </a:effectRef>
-          <a:fontRef idx="minor">
-            <a:schemeClr val="lt1"/>
-          </a:fontRef>
-        </p:style>
-        <p:txBody>
-          <a:bodyPr wrap="square">
-            <a:spAutoFit/>
-          </a:bodyPr>
-          <a:lstStyle/>
-          <a:p>
-            <a:pPr>
-              <a:spcBef>
-                <a:spcPts val="300"/>
-              </a:spcBef>
-              <a:spcAft>
-                <a:spcPts val="300"/>
-              </a:spcAft>
-              <a:defRPr/>
-            </a:pPr>
-            <a:r>
-              <a:rPr lang="fr-FR" sz="1600" b="1" noProof="1">
-                <a:solidFill>
-                  <a:schemeClr val="tx1"/>
-                </a:solidFill>
-              </a:rPr>
-              <a:t>Observation</a:t>
-            </a:r>
-            <a:r>
-              <a:rPr lang="fr-FR" sz="1600" noProof="1">
-                <a:solidFill>
-                  <a:schemeClr val="tx1"/>
-                </a:solidFill>
-              </a:rPr>
-              <a:t> (Reference)</a:t>
-            </a:r>
-          </a:p>
-        </p:txBody>
-      </p:sp>
-      <p:sp>
-        <p:nvSpPr>
-          <p:cNvPr id="22" name="Text Box 10">
-            <a:extLst>
-              <a:ext uri="{FF2B5EF4-FFF2-40B4-BE49-F238E27FC236}">
-                <a16:creationId xmlns:a16="http://schemas.microsoft.com/office/drawing/2014/main" id="{8E26439A-0504-C6AF-EE33-2E1027F86FCC}"/>
-              </a:ext>
-            </a:extLst>
-          </p:cNvPr>
-          <p:cNvSpPr txBox="1">
-            <a:spLocks noChangeArrowheads="1"/>
-          </p:cNvSpPr>
-          <p:nvPr/>
-        </p:nvSpPr>
-        <p:spPr bwMode="auto">
-          <a:xfrm>
-            <a:off x="766612" y="6389272"/>
-            <a:ext cx="3845730" cy="828000"/>
-          </a:xfrm>
-          <a:prstGeom prst="rect">
-            <a:avLst/>
-          </a:prstGeom>
-          <a:ln>
-            <a:headEnd/>
-            <a:tailEnd/>
-          </a:ln>
-        </p:spPr>
-        <p:style>
-          <a:lnRef idx="0">
-            <a:schemeClr val="accent3"/>
-          </a:lnRef>
-          <a:fillRef idx="3">
-            <a:schemeClr val="accent3"/>
-          </a:fillRef>
-          <a:effectRef idx="3">
-            <a:schemeClr val="accent3"/>
-          </a:effectRef>
-          <a:fontRef idx="minor">
-            <a:schemeClr val="lt1"/>
-          </a:fontRef>
-        </p:style>
-        <p:txBody>
-          <a:bodyPr wrap="square">
-            <a:spAutoFit/>
-          </a:bodyPr>
-          <a:lstStyle/>
-          <a:p>
-            <a:pPr>
-              <a:spcBef>
-                <a:spcPts val="300"/>
-              </a:spcBef>
-              <a:spcAft>
-                <a:spcPts val="300"/>
-              </a:spcAft>
-              <a:defRPr/>
-            </a:pPr>
-            <a:r>
-              <a:rPr lang="fr-FR" sz="1600" b="1" noProof="1">
-                <a:solidFill>
-                  <a:schemeClr val="tx1"/>
-                </a:solidFill>
-              </a:rPr>
-              <a:t>Hematology Studies </a:t>
-            </a:r>
-            <a:r>
-              <a:rPr lang="fr-FR" sz="1600" noProof="1">
-                <a:solidFill>
-                  <a:schemeClr val="tx1"/>
-                </a:solidFill>
-              </a:rPr>
-              <a:t>(Section)</a:t>
-            </a:r>
-          </a:p>
-          <a:p>
-            <a:pPr>
-              <a:spcBef>
-                <a:spcPts val="300"/>
-              </a:spcBef>
-              <a:spcAft>
-                <a:spcPts val="300"/>
-              </a:spcAft>
-              <a:defRPr/>
-            </a:pPr>
-            <a:endParaRPr lang="fr-FR" sz="1600" noProof="1">
-              <a:solidFill>
-                <a:schemeClr val="tx1"/>
-              </a:solidFill>
-            </a:endParaRPr>
-          </a:p>
-          <a:p>
-            <a:pPr>
-              <a:spcBef>
-                <a:spcPts val="300"/>
-              </a:spcBef>
-              <a:spcAft>
-                <a:spcPts val="300"/>
-              </a:spcAft>
-              <a:defRPr/>
-            </a:pPr>
-            <a:endParaRPr lang="fr-FR" sz="1600" noProof="1">
-              <a:solidFill>
-                <a:schemeClr val="tx1"/>
-              </a:solidFill>
-            </a:endParaRPr>
-          </a:p>
-        </p:txBody>
-      </p:sp>
-      <p:sp>
-        <p:nvSpPr>
-          <p:cNvPr id="23" name="Text Box 10">
-            <a:extLst>
-              <a:ext uri="{FF2B5EF4-FFF2-40B4-BE49-F238E27FC236}">
-                <a16:creationId xmlns:a16="http://schemas.microsoft.com/office/drawing/2014/main" id="{B7875FF3-B94B-542A-02A3-C1E58173CEA8}"/>
-              </a:ext>
-            </a:extLst>
-          </p:cNvPr>
-          <p:cNvSpPr txBox="1">
-            <a:spLocks noChangeArrowheads="1"/>
-          </p:cNvSpPr>
-          <p:nvPr/>
-        </p:nvSpPr>
-        <p:spPr bwMode="auto">
-          <a:xfrm>
-            <a:off x="901884" y="6743359"/>
-            <a:ext cx="3553575" cy="338554"/>
-          </a:xfrm>
-          <a:prstGeom prst="rect">
-            <a:avLst/>
-          </a:prstGeom>
-          <a:ln>
-            <a:headEnd/>
-            <a:tailEnd/>
-          </a:ln>
-        </p:spPr>
-        <p:style>
-          <a:lnRef idx="0">
-            <a:schemeClr val="accent3"/>
-          </a:lnRef>
-          <a:fillRef idx="3">
-            <a:schemeClr val="accent3"/>
-          </a:fillRef>
-          <a:effectRef idx="3">
-            <a:schemeClr val="accent3"/>
-          </a:effectRef>
-          <a:fontRef idx="minor">
-            <a:schemeClr val="lt1"/>
-          </a:fontRef>
-        </p:style>
-        <p:txBody>
-          <a:bodyPr wrap="square">
-            <a:spAutoFit/>
-          </a:bodyPr>
-          <a:lstStyle/>
-          <a:p>
-            <a:pPr>
-              <a:spcBef>
-                <a:spcPts val="300"/>
-              </a:spcBef>
-              <a:spcAft>
-                <a:spcPts val="300"/>
-              </a:spcAft>
-              <a:defRPr/>
-            </a:pPr>
-            <a:r>
-              <a:rPr lang="fr-FR" sz="1600" b="1" noProof="1">
-                <a:solidFill>
-                  <a:schemeClr val="tx1"/>
-                </a:solidFill>
-              </a:rPr>
-              <a:t>Observation</a:t>
-            </a:r>
-            <a:r>
-              <a:rPr lang="fr-FR" sz="1600" noProof="1">
-                <a:solidFill>
-                  <a:schemeClr val="tx1"/>
-                </a:solidFill>
-              </a:rPr>
-              <a:t> (Reference)</a:t>
-            </a:r>
-          </a:p>
-        </p:txBody>
-      </p:sp>
-      <p:sp>
-        <p:nvSpPr>
-          <p:cNvPr id="25" name="Text Box 10">
-            <a:extLst>
-              <a:ext uri="{FF2B5EF4-FFF2-40B4-BE49-F238E27FC236}">
-                <a16:creationId xmlns:a16="http://schemas.microsoft.com/office/drawing/2014/main" id="{23106D7F-BC60-BEBC-F106-CF13279D7A33}"/>
-              </a:ext>
-            </a:extLst>
-          </p:cNvPr>
-          <p:cNvSpPr txBox="1">
-            <a:spLocks noChangeArrowheads="1"/>
-          </p:cNvSpPr>
-          <p:nvPr/>
-        </p:nvSpPr>
-        <p:spPr bwMode="auto">
-          <a:xfrm>
-            <a:off x="771095" y="7316574"/>
-            <a:ext cx="3845730" cy="828000"/>
-          </a:xfrm>
-          <a:prstGeom prst="rect">
-            <a:avLst/>
-          </a:prstGeom>
-          <a:ln>
-            <a:headEnd/>
-            <a:tailEnd/>
-          </a:ln>
-        </p:spPr>
-        <p:style>
-          <a:lnRef idx="0">
-            <a:schemeClr val="accent3"/>
-          </a:lnRef>
-          <a:fillRef idx="3">
-            <a:schemeClr val="accent3"/>
-          </a:fillRef>
-          <a:effectRef idx="3">
-            <a:schemeClr val="accent3"/>
-          </a:effectRef>
-          <a:fontRef idx="minor">
-            <a:schemeClr val="lt1"/>
-          </a:fontRef>
-        </p:style>
-        <p:txBody>
-          <a:bodyPr wrap="square">
-            <a:spAutoFit/>
-          </a:bodyPr>
-          <a:lstStyle/>
-          <a:p>
-            <a:pPr>
-              <a:spcBef>
-                <a:spcPts val="300"/>
-              </a:spcBef>
-              <a:spcAft>
-                <a:spcPts val="300"/>
-              </a:spcAft>
-              <a:defRPr/>
-            </a:pPr>
-            <a:r>
-              <a:rPr lang="fr-FR" sz="1600" b="1" noProof="1">
-                <a:solidFill>
-                  <a:schemeClr val="tx1"/>
-                </a:solidFill>
-              </a:rPr>
-              <a:t>Microbiology Studies </a:t>
-            </a:r>
-            <a:r>
-              <a:rPr lang="fr-FR" sz="1600" noProof="1">
-                <a:solidFill>
-                  <a:schemeClr val="tx1"/>
-                </a:solidFill>
-              </a:rPr>
-              <a:t>(Section)</a:t>
-            </a:r>
-          </a:p>
-          <a:p>
-            <a:pPr>
-              <a:spcBef>
-                <a:spcPts val="300"/>
-              </a:spcBef>
-              <a:spcAft>
-                <a:spcPts val="300"/>
-              </a:spcAft>
-              <a:defRPr/>
-            </a:pPr>
-            <a:endParaRPr lang="fr-FR" sz="1600" noProof="1">
-              <a:solidFill>
-                <a:schemeClr val="tx1"/>
-              </a:solidFill>
-            </a:endParaRPr>
-          </a:p>
-          <a:p>
-            <a:pPr>
-              <a:spcBef>
-                <a:spcPts val="300"/>
-              </a:spcBef>
-              <a:spcAft>
-                <a:spcPts val="300"/>
-              </a:spcAft>
-              <a:defRPr/>
-            </a:pPr>
-            <a:endParaRPr lang="fr-FR" sz="1600" noProof="1">
-              <a:solidFill>
-                <a:schemeClr val="tx1"/>
-              </a:solidFill>
-            </a:endParaRPr>
-          </a:p>
-        </p:txBody>
-      </p:sp>
-      <p:sp>
-        <p:nvSpPr>
-          <p:cNvPr id="26" name="Text Box 10">
-            <a:extLst>
-              <a:ext uri="{FF2B5EF4-FFF2-40B4-BE49-F238E27FC236}">
-                <a16:creationId xmlns:a16="http://schemas.microsoft.com/office/drawing/2014/main" id="{C2D46CAB-A6AD-E6F2-9938-ED26845D698B}"/>
-              </a:ext>
-            </a:extLst>
-          </p:cNvPr>
-          <p:cNvSpPr txBox="1">
-            <a:spLocks noChangeArrowheads="1"/>
-          </p:cNvSpPr>
-          <p:nvPr/>
-        </p:nvSpPr>
-        <p:spPr bwMode="auto">
-          <a:xfrm>
-            <a:off x="901884" y="7672894"/>
-            <a:ext cx="3553575" cy="338554"/>
-          </a:xfrm>
-          <a:prstGeom prst="rect">
-            <a:avLst/>
-          </a:prstGeom>
-          <a:ln>
-            <a:headEnd/>
-            <a:tailEnd/>
-          </a:ln>
-        </p:spPr>
-        <p:style>
-          <a:lnRef idx="0">
-            <a:schemeClr val="accent3"/>
-          </a:lnRef>
-          <a:fillRef idx="3">
-            <a:schemeClr val="accent3"/>
-          </a:fillRef>
-          <a:effectRef idx="3">
-            <a:schemeClr val="accent3"/>
-          </a:effectRef>
-          <a:fontRef idx="minor">
-            <a:schemeClr val="lt1"/>
-          </a:fontRef>
-        </p:style>
-        <p:txBody>
-          <a:bodyPr wrap="square">
-            <a:spAutoFit/>
-          </a:bodyPr>
-          <a:lstStyle/>
-          <a:p>
-            <a:pPr>
-              <a:spcBef>
-                <a:spcPts val="300"/>
-              </a:spcBef>
-              <a:spcAft>
-                <a:spcPts val="300"/>
-              </a:spcAft>
-              <a:defRPr/>
-            </a:pPr>
-            <a:r>
-              <a:rPr lang="fr-FR" sz="1600" b="1" noProof="1">
-                <a:solidFill>
-                  <a:schemeClr val="tx1"/>
-                </a:solidFill>
-              </a:rPr>
-              <a:t>Observation</a:t>
-            </a:r>
-            <a:r>
-              <a:rPr lang="fr-FR" sz="1600" noProof="1">
-                <a:solidFill>
-                  <a:schemeClr val="tx1"/>
-                </a:solidFill>
-              </a:rPr>
-              <a:t> (Reference)</a:t>
-            </a:r>
-          </a:p>
-        </p:txBody>
-      </p:sp>
-      <p:sp>
-        <p:nvSpPr>
-          <p:cNvPr id="28" name="Text Box 10">
-            <a:extLst>
-              <a:ext uri="{FF2B5EF4-FFF2-40B4-BE49-F238E27FC236}">
-                <a16:creationId xmlns:a16="http://schemas.microsoft.com/office/drawing/2014/main" id="{1E74D67D-A0F2-5934-45CA-AFB3E59E4DEB}"/>
-              </a:ext>
-            </a:extLst>
-          </p:cNvPr>
-          <p:cNvSpPr txBox="1">
-            <a:spLocks noChangeArrowheads="1"/>
-          </p:cNvSpPr>
-          <p:nvPr/>
-        </p:nvSpPr>
-        <p:spPr bwMode="auto">
-          <a:xfrm>
-            <a:off x="613408" y="8316926"/>
-            <a:ext cx="4184753" cy="1229777"/>
-          </a:xfrm>
-          <a:prstGeom prst="rect">
-            <a:avLst/>
-          </a:prstGeom>
-          <a:ln>
-            <a:headEnd/>
-            <a:tailEnd/>
-          </a:ln>
-        </p:spPr>
-        <p:style>
-          <a:lnRef idx="0">
-            <a:schemeClr val="accent3"/>
-          </a:lnRef>
-          <a:fillRef idx="3">
-            <a:schemeClr val="accent3"/>
-          </a:fillRef>
-          <a:effectRef idx="3">
-            <a:schemeClr val="accent3"/>
-          </a:effectRef>
-          <a:fontRef idx="minor">
-            <a:schemeClr val="lt1"/>
-          </a:fontRef>
-        </p:style>
-        <p:txBody>
-          <a:bodyPr wrap="square">
-            <a:noAutofit/>
-          </a:bodyPr>
-          <a:lstStyle/>
-          <a:p>
-            <a:pPr>
-              <a:spcBef>
-                <a:spcPts val="300"/>
-              </a:spcBef>
-              <a:spcAft>
-                <a:spcPts val="300"/>
-              </a:spcAft>
-              <a:defRPr/>
-            </a:pPr>
-            <a:r>
-              <a:rPr lang="fr-FR" sz="1600" b="1" noProof="1">
-                <a:solidFill>
-                  <a:schemeClr val="tx1"/>
-                </a:solidFill>
-              </a:rPr>
-              <a:t>Pregnancy Progress </a:t>
-            </a:r>
-            <a:r>
-              <a:rPr lang="fr-FR" sz="1600" noProof="1">
-                <a:solidFill>
-                  <a:schemeClr val="tx1"/>
-                </a:solidFill>
-              </a:rPr>
-              <a:t>(Section)</a:t>
-            </a:r>
-          </a:p>
-        </p:txBody>
-      </p:sp>
-      <p:sp>
-        <p:nvSpPr>
-          <p:cNvPr id="29" name="Text Box 10">
-            <a:extLst>
-              <a:ext uri="{FF2B5EF4-FFF2-40B4-BE49-F238E27FC236}">
-                <a16:creationId xmlns:a16="http://schemas.microsoft.com/office/drawing/2014/main" id="{DAED9EC5-5311-B2F5-73C7-BE19152B69BF}"/>
-              </a:ext>
-            </a:extLst>
-          </p:cNvPr>
-          <p:cNvSpPr txBox="1">
-            <a:spLocks noChangeArrowheads="1"/>
-          </p:cNvSpPr>
-          <p:nvPr/>
-        </p:nvSpPr>
-        <p:spPr bwMode="auto">
-          <a:xfrm>
-            <a:off x="757646" y="8664016"/>
-            <a:ext cx="3845730" cy="338554"/>
-          </a:xfrm>
-          <a:prstGeom prst="rect">
-            <a:avLst/>
-          </a:prstGeom>
-          <a:ln>
-            <a:headEnd/>
-            <a:tailEnd/>
-          </a:ln>
-        </p:spPr>
-        <p:style>
-          <a:lnRef idx="0">
-            <a:schemeClr val="accent3"/>
-          </a:lnRef>
-          <a:fillRef idx="3">
-            <a:schemeClr val="accent3"/>
-          </a:fillRef>
-          <a:effectRef idx="3">
-            <a:schemeClr val="accent3"/>
-          </a:effectRef>
-          <a:fontRef idx="minor">
-            <a:schemeClr val="lt1"/>
-          </a:fontRef>
-        </p:style>
-        <p:txBody>
-          <a:bodyPr wrap="square">
-            <a:spAutoFit/>
-          </a:bodyPr>
-          <a:lstStyle/>
-          <a:p>
-            <a:pPr>
-              <a:spcBef>
-                <a:spcPts val="300"/>
-              </a:spcBef>
-              <a:spcAft>
-                <a:spcPts val="300"/>
-              </a:spcAft>
-              <a:defRPr/>
-            </a:pPr>
-            <a:r>
-              <a:rPr lang="fr-FR" sz="1600" b="1" noProof="1">
-                <a:solidFill>
-                  <a:schemeClr val="tx1"/>
-                </a:solidFill>
-              </a:rPr>
-              <a:t>Encounter</a:t>
-            </a:r>
-            <a:r>
-              <a:rPr lang="fr-FR" sz="1600" noProof="1">
-                <a:solidFill>
-                  <a:schemeClr val="tx1"/>
-                </a:solidFill>
-              </a:rPr>
-              <a:t> (Reference)</a:t>
-            </a:r>
-          </a:p>
-        </p:txBody>
-      </p:sp>
-      <p:sp>
-        <p:nvSpPr>
-          <p:cNvPr id="2" name="Text Box 10">
-            <a:extLst>
-              <a:ext uri="{FF2B5EF4-FFF2-40B4-BE49-F238E27FC236}">
-                <a16:creationId xmlns:a16="http://schemas.microsoft.com/office/drawing/2014/main" id="{96B5F982-179C-DCCA-5B44-E094FA5A0CC4}"/>
-              </a:ext>
-            </a:extLst>
-          </p:cNvPr>
-          <p:cNvSpPr txBox="1">
-            <a:spLocks noChangeArrowheads="1"/>
-          </p:cNvSpPr>
-          <p:nvPr/>
-        </p:nvSpPr>
-        <p:spPr bwMode="auto">
-          <a:xfrm>
-            <a:off x="757646" y="9069921"/>
-            <a:ext cx="3845730" cy="338554"/>
-          </a:xfrm>
-          <a:prstGeom prst="rect">
-            <a:avLst/>
-          </a:prstGeom>
-          <a:ln>
-            <a:headEnd/>
-            <a:tailEnd/>
-          </a:ln>
-        </p:spPr>
-        <p:style>
-          <a:lnRef idx="0">
-            <a:schemeClr val="accent3"/>
-          </a:lnRef>
-          <a:fillRef idx="3">
-            <a:schemeClr val="accent3"/>
-          </a:fillRef>
-          <a:effectRef idx="3">
-            <a:schemeClr val="accent3"/>
-          </a:effectRef>
-          <a:fontRef idx="minor">
-            <a:schemeClr val="lt1"/>
-          </a:fontRef>
-        </p:style>
-        <p:txBody>
-          <a:bodyPr wrap="square">
-            <a:spAutoFit/>
-          </a:bodyPr>
-          <a:lstStyle/>
-          <a:p>
-            <a:pPr>
-              <a:spcBef>
-                <a:spcPts val="300"/>
-              </a:spcBef>
-              <a:spcAft>
-                <a:spcPts val="300"/>
-              </a:spcAft>
-              <a:defRPr/>
-            </a:pPr>
-            <a:r>
-              <a:rPr lang="fr-FR" sz="1600" b="1" noProof="1">
-                <a:solidFill>
-                  <a:schemeClr val="tx1"/>
-                </a:solidFill>
-              </a:rPr>
-              <a:t>Observation</a:t>
-            </a:r>
-            <a:r>
-              <a:rPr lang="fr-FR" sz="1600" noProof="1">
-                <a:solidFill>
-                  <a:schemeClr val="tx1"/>
-                </a:solidFill>
-              </a:rPr>
-              <a:t> (Reference)</a:t>
-            </a:r>
           </a:p>
         </p:txBody>
       </p:sp>

</xml_diff>